<commit_message>
Commit Teoria 1 - 2a Reuniao
</commit_message>
<xml_diff>
--- a/teoria1/Teoria1r2.pptx
+++ b/teoria1/Teoria1r2.pptx
@@ -275,7 +275,7 @@
           <a:p>
             <a:fld id="{EFD0D0C2-A165-4226-AD43-D695A5F93656}" type="datetimeFigureOut">
               <a:rPr lang="pt-BR" smtClean="0"/>
-              <a:t>09/06/2022</a:t>
+              <a:t>10/06/2022</a:t>
             </a:fld>
             <a:endParaRPr lang="pt-BR"/>
           </a:p>
@@ -473,7 +473,7 @@
           <a:p>
             <a:fld id="{EFD0D0C2-A165-4226-AD43-D695A5F93656}" type="datetimeFigureOut">
               <a:rPr lang="pt-BR" smtClean="0"/>
-              <a:t>09/06/2022</a:t>
+              <a:t>10/06/2022</a:t>
             </a:fld>
             <a:endParaRPr lang="pt-BR"/>
           </a:p>
@@ -681,7 +681,7 @@
           <a:p>
             <a:fld id="{EFD0D0C2-A165-4226-AD43-D695A5F93656}" type="datetimeFigureOut">
               <a:rPr lang="pt-BR" smtClean="0"/>
-              <a:t>09/06/2022</a:t>
+              <a:t>10/06/2022</a:t>
             </a:fld>
             <a:endParaRPr lang="pt-BR"/>
           </a:p>
@@ -879,7 +879,7 @@
           <a:p>
             <a:fld id="{EFD0D0C2-A165-4226-AD43-D695A5F93656}" type="datetimeFigureOut">
               <a:rPr lang="pt-BR" smtClean="0"/>
-              <a:t>09/06/2022</a:t>
+              <a:t>10/06/2022</a:t>
             </a:fld>
             <a:endParaRPr lang="pt-BR"/>
           </a:p>
@@ -1154,7 +1154,7 @@
           <a:p>
             <a:fld id="{EFD0D0C2-A165-4226-AD43-D695A5F93656}" type="datetimeFigureOut">
               <a:rPr lang="pt-BR" smtClean="0"/>
-              <a:t>09/06/2022</a:t>
+              <a:t>10/06/2022</a:t>
             </a:fld>
             <a:endParaRPr lang="pt-BR"/>
           </a:p>
@@ -1419,7 +1419,7 @@
           <a:p>
             <a:fld id="{EFD0D0C2-A165-4226-AD43-D695A5F93656}" type="datetimeFigureOut">
               <a:rPr lang="pt-BR" smtClean="0"/>
-              <a:t>09/06/2022</a:t>
+              <a:t>10/06/2022</a:t>
             </a:fld>
             <a:endParaRPr lang="pt-BR"/>
           </a:p>
@@ -1831,7 +1831,7 @@
           <a:p>
             <a:fld id="{EFD0D0C2-A165-4226-AD43-D695A5F93656}" type="datetimeFigureOut">
               <a:rPr lang="pt-BR" smtClean="0"/>
-              <a:t>09/06/2022</a:t>
+              <a:t>10/06/2022</a:t>
             </a:fld>
             <a:endParaRPr lang="pt-BR"/>
           </a:p>
@@ -1972,7 +1972,7 @@
           <a:p>
             <a:fld id="{EFD0D0C2-A165-4226-AD43-D695A5F93656}" type="datetimeFigureOut">
               <a:rPr lang="pt-BR" smtClean="0"/>
-              <a:t>09/06/2022</a:t>
+              <a:t>10/06/2022</a:t>
             </a:fld>
             <a:endParaRPr lang="pt-BR"/>
           </a:p>
@@ -2085,7 +2085,7 @@
           <a:p>
             <a:fld id="{EFD0D0C2-A165-4226-AD43-D695A5F93656}" type="datetimeFigureOut">
               <a:rPr lang="pt-BR" smtClean="0"/>
-              <a:t>09/06/2022</a:t>
+              <a:t>10/06/2022</a:t>
             </a:fld>
             <a:endParaRPr lang="pt-BR"/>
           </a:p>
@@ -2396,7 +2396,7 @@
           <a:p>
             <a:fld id="{EFD0D0C2-A165-4226-AD43-D695A5F93656}" type="datetimeFigureOut">
               <a:rPr lang="pt-BR" smtClean="0"/>
-              <a:t>09/06/2022</a:t>
+              <a:t>10/06/2022</a:t>
             </a:fld>
             <a:endParaRPr lang="pt-BR"/>
           </a:p>
@@ -2684,7 +2684,7 @@
           <a:p>
             <a:fld id="{EFD0D0C2-A165-4226-AD43-D695A5F93656}" type="datetimeFigureOut">
               <a:rPr lang="pt-BR" smtClean="0"/>
-              <a:t>09/06/2022</a:t>
+              <a:t>10/06/2022</a:t>
             </a:fld>
             <a:endParaRPr lang="pt-BR"/>
           </a:p>
@@ -2928,7 +2928,7 @@
           <a:p>
             <a:fld id="{EFD0D0C2-A165-4226-AD43-D695A5F93656}" type="datetimeFigureOut">
               <a:rPr lang="pt-BR" smtClean="0"/>
-              <a:t>09/06/2022</a:t>
+              <a:t>10/06/2022</a:t>
             </a:fld>
             <a:endParaRPr lang="pt-BR"/>
           </a:p>
@@ -10809,15 +10809,15 @@
                   <a:schemeClr val="accent1"/>
                 </a:solidFill>
               </a:rPr>
-              <a:t>MaCom</a:t>
-            </a:r>
-            <a:r>
-              <a:rPr lang="pt-BR" sz="2400" b="1" dirty="0">
-                <a:solidFill>
-                  <a:schemeClr val="accent1"/>
-                </a:solidFill>
-              </a:rPr>
-              <a:t> </a:t>
+              <a:t>MaCo</a:t>
+            </a:r>
+            <a:r>
+              <a:rPr lang="pt-BR" sz="2400" b="1">
+                <a:solidFill>
+                  <a:schemeClr val="accent1"/>
+                </a:solidFill>
+              </a:rPr>
+              <a:t>, </a:t>
             </a:r>
             <a:r>
               <a:rPr lang="pt-BR" sz="2400" b="1" dirty="0" err="1">

</xml_diff>